<commit_message>
Working out the power point presentation
</commit_message>
<xml_diff>
--- a/Plots.pptx
+++ b/Plots.pptx
@@ -528,21 +528,7 @@
                 <a:latin typeface="Avenir Book" panose="02000503020000020003" pitchFamily="2" charset="0"/>
                 <a:cs typeface="AL BAYAN PLAIN" pitchFamily="2" charset="-78"/>
               </a:rPr>
-              <a:t>Is it possible to obtain informed consent online via internet/</a:t>
-            </a:r>
-            <a:r>
-              <a:rPr lang="en-GB" sz="1200" b="1" dirty="0" err="1">
-                <a:latin typeface="Avenir Book" panose="02000503020000020003" pitchFamily="2" charset="0"/>
-                <a:cs typeface="AL BAYAN PLAIN" pitchFamily="2" charset="-78"/>
-              </a:rPr>
-              <a:t>telefone</a:t>
-            </a:r>
-            <a:r>
-              <a:rPr lang="en-GB" sz="1200" b="1" dirty="0">
-                <a:latin typeface="Avenir Book" panose="02000503020000020003" pitchFamily="2" charset="0"/>
-                <a:cs typeface="AL BAYAN PLAIN" pitchFamily="2" charset="-78"/>
-              </a:rPr>
-              <a:t> in your routine setting? (stratified by high, middle and low Gross Domestic Product per capita (</a:t>
+              <a:t>Is it possible to obtain informed consent online via internet/telefone in your routine setting? (stratified by high, middle and low Gross Domestic Product per capita (</a:t>
             </a:r>
             <a:r>
               <a:rPr lang="en-GB" sz="1200" b="1" dirty="0" err="1">
@@ -3853,7 +3839,7 @@
         </p:nvSpPr>
         <p:spPr>
           <a:xfrm>
-            <a:off x="1252888" y="6070392"/>
+            <a:off x="2903562" y="6070392"/>
             <a:ext cx="1665769" cy="461665"/>
           </a:xfrm>
           <a:prstGeom prst="rect">
@@ -3867,9 +3853,9 @@
           <a:lstStyle/>
           <a:p>
             <a:r>
-              <a:rPr lang="de-DE" sz="2400" b="1" dirty="0">
+              <a:rPr lang="de-DE" sz="2400" dirty="0">
                 <a:latin typeface="Avenir Book" panose="02000503020000020003" pitchFamily="2" charset="0"/>
-                <a:cs typeface="AL BAYAN PLAIN" pitchFamily="2" charset="-78"/>
+                <a:cs typeface="Al Bayan Plain" pitchFamily="2" charset="-78"/>
               </a:rPr>
               <a:t>A: Internet</a:t>
             </a:r>
@@ -3890,7 +3876,7 @@
         </p:nvSpPr>
         <p:spPr>
           <a:xfrm>
-            <a:off x="5663792" y="6085782"/>
+            <a:off x="7611348" y="6085782"/>
             <a:ext cx="1940412" cy="461665"/>
           </a:xfrm>
           <a:prstGeom prst="rect">
@@ -3905,9 +3891,9 @@
           <a:lstStyle/>
           <a:p>
             <a:r>
-              <a:rPr lang="de-DE" sz="2400" b="1" dirty="0">
+              <a:rPr lang="de-DE" sz="2400" dirty="0">
                 <a:latin typeface="Avenir Book" panose="02000503020000020003" pitchFamily="2" charset="0"/>
-                <a:cs typeface="AL BAYAN PLAIN" pitchFamily="2" charset="-78"/>
+                <a:cs typeface="Al Bayan Plain" pitchFamily="2" charset="-78"/>
               </a:rPr>
               <a:t>B: Telefone</a:t>
             </a:r>
@@ -3929,7 +3915,7 @@
         </p:nvGrpSpPr>
         <p:grpSpPr>
           <a:xfrm>
-            <a:off x="90523" y="781861"/>
+            <a:off x="1111798" y="888736"/>
             <a:ext cx="4171017" cy="4954772"/>
             <a:chOff x="90523" y="1625005"/>
             <a:chExt cx="4171017" cy="4954772"/>
@@ -4226,7 +4212,7 @@
         </p:nvGrpSpPr>
         <p:grpSpPr>
           <a:xfrm>
-            <a:off x="4591938" y="783456"/>
+            <a:off x="5993227" y="925956"/>
             <a:ext cx="4112583" cy="4953177"/>
             <a:chOff x="4591938" y="783456"/>
             <a:chExt cx="4112583" cy="4953177"/>
@@ -4523,8 +4509,8 @@
         </p:nvSpPr>
         <p:spPr>
           <a:xfrm>
-            <a:off x="219738" y="85248"/>
-            <a:ext cx="11406205" cy="369332"/>
+            <a:off x="2130836" y="140787"/>
+            <a:ext cx="7930328" cy="646331"/>
           </a:xfrm>
           <a:prstGeom prst="rect">
             <a:avLst/>
@@ -4536,33 +4522,19 @@
           </a:bodyPr>
           <a:lstStyle/>
           <a:p>
-            <a:pPr lvl="0">
+            <a:pPr lvl="0" algn="ctr">
               <a:defRPr/>
             </a:pPr>
             <a:r>
-              <a:rPr lang="en-GB" b="1" dirty="0">
+              <a:rPr lang="en-GB" dirty="0">
                 <a:latin typeface="Avenir Book" panose="02000503020000020003" pitchFamily="2" charset="0"/>
-                <a:cs typeface="AL BAYAN PLAIN" pitchFamily="2" charset="-78"/>
+                <a:cs typeface="Al Bayan Plain" pitchFamily="2" charset="-78"/>
               </a:rPr>
-              <a:t>Is it possible to obtain informed consent online via internet/</a:t>
-            </a:r>
-            <a:r>
-              <a:rPr lang="en-GB" b="1" dirty="0" err="1">
-                <a:latin typeface="Avenir Book" panose="02000503020000020003" pitchFamily="2" charset="0"/>
-                <a:cs typeface="AL BAYAN PLAIN" pitchFamily="2" charset="-78"/>
-              </a:rPr>
-              <a:t>telefone</a:t>
-            </a:r>
-            <a:r>
-              <a:rPr lang="en-GB" b="1" dirty="0">
-                <a:latin typeface="Avenir Book" panose="02000503020000020003" pitchFamily="2" charset="0"/>
-                <a:cs typeface="AL BAYAN PLAIN" pitchFamily="2" charset="-78"/>
-              </a:rPr>
-              <a:t> in your routine setting? </a:t>
-            </a:r>
-            <a:endParaRPr lang="de-DE" b="1" dirty="0">
+              <a:t>Is it possible to obtain informed consent online via internet/telefone in your routine setting? </a:t>
+            </a:r>
+            <a:endParaRPr lang="de-DE" dirty="0">
               <a:latin typeface="Avenir Book" panose="02000503020000020003" pitchFamily="2" charset="0"/>
-              <a:cs typeface="AL BAYAN PLAIN" pitchFamily="2" charset="-78"/>
+              <a:cs typeface="Al Bayan Plain" pitchFamily="2" charset="-78"/>
             </a:endParaRPr>
           </a:p>
         </p:txBody>
@@ -4597,121 +4569,12 @@
           <a:chExt cx="0" cy="0"/>
         </a:xfrm>
       </p:grpSpPr>
-      <p:pic>
-        <p:nvPicPr>
-          <p:cNvPr id="13" name="Picture 12">
-            <a:extLst>
-              <a:ext uri="{FF2B5EF4-FFF2-40B4-BE49-F238E27FC236}">
-                <a16:creationId xmlns:a16="http://schemas.microsoft.com/office/drawing/2014/main" id="{47D1911F-EE8F-2743-B560-69757831C68C}"/>
-              </a:ext>
-            </a:extLst>
-          </p:cNvPr>
-          <p:cNvPicPr>
-            <a:picLocks noChangeAspect="1"/>
-          </p:cNvPicPr>
-          <p:nvPr/>
-        </p:nvPicPr>
-        <p:blipFill>
-          <a:blip r:embed="rId2"/>
-          <a:stretch>
-            <a:fillRect/>
-          </a:stretch>
-        </p:blipFill>
-        <p:spPr>
-          <a:xfrm>
-            <a:off x="-16151" y="2291938"/>
-            <a:ext cx="4017078" cy="3301340"/>
-          </a:xfrm>
-          <a:prstGeom prst="rect">
-            <a:avLst/>
-          </a:prstGeom>
-        </p:spPr>
-      </p:pic>
-      <p:pic>
-        <p:nvPicPr>
-          <p:cNvPr id="17" name="Picture 16">
-            <a:extLst>
-              <a:ext uri="{FF2B5EF4-FFF2-40B4-BE49-F238E27FC236}">
-                <a16:creationId xmlns:a16="http://schemas.microsoft.com/office/drawing/2014/main" id="{4091F5DF-42DB-9045-9DD8-104D2A97ABAB}"/>
-              </a:ext>
-            </a:extLst>
-          </p:cNvPr>
-          <p:cNvPicPr>
-            <a:picLocks noChangeAspect="1"/>
-          </p:cNvPicPr>
-          <p:nvPr/>
-        </p:nvPicPr>
-        <p:blipFill>
-          <a:blip r:embed="rId3"/>
-          <a:stretch>
-            <a:fillRect/>
-          </a:stretch>
-        </p:blipFill>
-        <p:spPr>
-          <a:xfrm>
-            <a:off x="4181928" y="2308018"/>
-            <a:ext cx="3893290" cy="3273386"/>
-          </a:xfrm>
-          <a:prstGeom prst="rect">
-            <a:avLst/>
-          </a:prstGeom>
-        </p:spPr>
-      </p:pic>
-      <p:sp>
-        <p:nvSpPr>
-          <p:cNvPr id="18" name="Rectangle 17">
-            <a:extLst>
-              <a:ext uri="{FF2B5EF4-FFF2-40B4-BE49-F238E27FC236}">
-                <a16:creationId xmlns:a16="http://schemas.microsoft.com/office/drawing/2014/main" id="{2B053742-1DBE-5C4A-85DD-94093B64BEEC}"/>
-              </a:ext>
-            </a:extLst>
-          </p:cNvPr>
-          <p:cNvSpPr/>
-          <p:nvPr/>
-        </p:nvSpPr>
-        <p:spPr>
-          <a:xfrm>
-            <a:off x="204765" y="268069"/>
-            <a:ext cx="12276201" cy="646331"/>
-          </a:xfrm>
-          <a:prstGeom prst="rect">
-            <a:avLst/>
-          </a:prstGeom>
-        </p:spPr>
-        <p:txBody>
-          <a:bodyPr wrap="square">
-            <a:spAutoFit/>
-          </a:bodyPr>
-          <a:lstStyle/>
-          <a:p>
-            <a:r>
-              <a:rPr lang="en-GB" dirty="0">
-                <a:latin typeface="Calibri" panose="020F0502020204030204" pitchFamily="34" charset="0"/>
-              </a:rPr>
-              <a:t>When do you need to obtain Informed consent for elective surgery based on legal requirements in elective an repeated </a:t>
-            </a:r>
-            <a:r>
-              <a:rPr lang="en-GB" dirty="0" err="1">
-                <a:latin typeface="Calibri" panose="020F0502020204030204" pitchFamily="34" charset="0"/>
-              </a:rPr>
-              <a:t>anesthesia</a:t>
-            </a:r>
-            <a:r>
-              <a:rPr lang="en-GB" dirty="0">
-                <a:latin typeface="Calibri" panose="020F0502020204030204" pitchFamily="34" charset="0"/>
-              </a:rPr>
-              <a:t>?</a:t>
-            </a:r>
-            <a:endParaRPr lang="de-DE" dirty="0"/>
-          </a:p>
-        </p:txBody>
-      </p:sp>
       <p:grpSp>
         <p:nvGrpSpPr>
-          <p:cNvPr id="19" name="Group 18">
-            <a:extLst>
-              <a:ext uri="{FF2B5EF4-FFF2-40B4-BE49-F238E27FC236}">
-                <a16:creationId xmlns:a16="http://schemas.microsoft.com/office/drawing/2014/main" id="{82846ABA-4A1C-C649-A53C-7AF05B8991CE}"/>
+          <p:cNvPr id="26" name="Group 25">
+            <a:extLst>
+              <a:ext uri="{FF2B5EF4-FFF2-40B4-BE49-F238E27FC236}">
+                <a16:creationId xmlns:a16="http://schemas.microsoft.com/office/drawing/2014/main" id="{7534C326-959D-3B41-9C16-362115B32AE4}"/>
               </a:ext>
             </a:extLst>
           </p:cNvPr>
@@ -4720,18 +4583,78 @@
         </p:nvGrpSpPr>
         <p:grpSpPr>
           <a:xfrm>
-            <a:off x="421619" y="6072555"/>
-            <a:ext cx="11147307" cy="483252"/>
-            <a:chOff x="421619" y="6072555"/>
-            <a:chExt cx="11147307" cy="483252"/>
+            <a:off x="-16151" y="256193"/>
+            <a:ext cx="11418827" cy="5709362"/>
+            <a:chOff x="-16151" y="256193"/>
+            <a:chExt cx="11418827" cy="5709362"/>
           </a:xfrm>
         </p:grpSpPr>
+        <p:pic>
+          <p:nvPicPr>
+            <p:cNvPr id="13" name="Picture 12">
+              <a:extLst>
+                <a:ext uri="{FF2B5EF4-FFF2-40B4-BE49-F238E27FC236}">
+                  <a16:creationId xmlns:a16="http://schemas.microsoft.com/office/drawing/2014/main" id="{47D1911F-EE8F-2743-B560-69757831C68C}"/>
+                </a:ext>
+              </a:extLst>
+            </p:cNvPr>
+            <p:cNvPicPr>
+              <a:picLocks noChangeAspect="1"/>
+            </p:cNvPicPr>
+            <p:nvPr/>
+          </p:nvPicPr>
+          <p:blipFill>
+            <a:blip r:embed="rId2"/>
+            <a:stretch>
+              <a:fillRect/>
+            </a:stretch>
+          </p:blipFill>
+          <p:spPr>
+            <a:xfrm>
+              <a:off x="-16151" y="1698171"/>
+              <a:ext cx="4017078" cy="3301340"/>
+            </a:xfrm>
+            <a:prstGeom prst="rect">
+              <a:avLst/>
+            </a:prstGeom>
+          </p:spPr>
+        </p:pic>
+        <p:pic>
+          <p:nvPicPr>
+            <p:cNvPr id="17" name="Picture 16">
+              <a:extLst>
+                <a:ext uri="{FF2B5EF4-FFF2-40B4-BE49-F238E27FC236}">
+                  <a16:creationId xmlns:a16="http://schemas.microsoft.com/office/drawing/2014/main" id="{4091F5DF-42DB-9045-9DD8-104D2A97ABAB}"/>
+                </a:ext>
+              </a:extLst>
+            </p:cNvPr>
+            <p:cNvPicPr>
+              <a:picLocks noChangeAspect="1"/>
+            </p:cNvPicPr>
+            <p:nvPr/>
+          </p:nvPicPr>
+          <p:blipFill>
+            <a:blip r:embed="rId3"/>
+            <a:stretch>
+              <a:fillRect/>
+            </a:stretch>
+          </p:blipFill>
+          <p:spPr>
+            <a:xfrm>
+              <a:off x="4086928" y="1714251"/>
+              <a:ext cx="3893290" cy="3273386"/>
+            </a:xfrm>
+            <a:prstGeom prst="rect">
+              <a:avLst/>
+            </a:prstGeom>
+          </p:spPr>
+        </p:pic>
         <p:sp>
           <p:nvSpPr>
-            <p:cNvPr id="20" name="Rectangle 19">
+            <p:cNvPr id="18" name="Rectangle 17">
               <a:extLst>
                 <a:ext uri="{FF2B5EF4-FFF2-40B4-BE49-F238E27FC236}">
-                  <a16:creationId xmlns:a16="http://schemas.microsoft.com/office/drawing/2014/main" id="{D53A2ECD-D26B-814A-BE47-711905896000}"/>
+                  <a16:creationId xmlns:a16="http://schemas.microsoft.com/office/drawing/2014/main" id="{2B053742-1DBE-5C4A-85DD-94093B64BEEC}"/>
                 </a:ext>
               </a:extLst>
             </p:cNvPr>
@@ -4740,8 +4663,8 @@
           </p:nvSpPr>
           <p:spPr>
             <a:xfrm>
-              <a:off x="421619" y="6094142"/>
-              <a:ext cx="1665769" cy="461665"/>
+              <a:off x="1371642" y="256193"/>
+              <a:ext cx="9057988" cy="646331"/>
             </a:xfrm>
             <a:prstGeom prst="rect">
               <a:avLst/>
@@ -4753,125 +4676,184 @@
             </a:bodyPr>
             <a:lstStyle/>
             <a:p>
+              <a:pPr algn="ctr"/>
               <a:r>
-                <a:rPr lang="de-DE" sz="2400" b="1" dirty="0">
-                  <a:latin typeface="Avenir Book" panose="02000503020000020003" pitchFamily="2" charset="0"/>
-                  <a:cs typeface="AL BAYAN PLAIN" pitchFamily="2" charset="-78"/>
+                <a:rPr lang="en-GB" dirty="0">
+                  <a:latin typeface="Calibri" panose="020F0502020204030204" pitchFamily="34" charset="0"/>
                 </a:rPr>
-                <a:t>A: Simple</a:t>
+                <a:t>When do you need to obtain Informed consent for elective surgery based on legal requirements in elective an repeated anaesthesia?</a:t>
               </a:r>
+              <a:endParaRPr lang="de-DE" dirty="0"/>
             </a:p>
           </p:txBody>
         </p:sp>
-        <p:sp>
-          <p:nvSpPr>
-            <p:cNvPr id="21" name="TextBox 20">
+        <p:grpSp>
+          <p:nvGrpSpPr>
+            <p:cNvPr id="19" name="Group 18">
               <a:extLst>
                 <a:ext uri="{FF2B5EF4-FFF2-40B4-BE49-F238E27FC236}">
-                  <a16:creationId xmlns:a16="http://schemas.microsoft.com/office/drawing/2014/main" id="{92809091-7F62-3445-A607-AE06BB6F9A59}"/>
+                  <a16:creationId xmlns:a16="http://schemas.microsoft.com/office/drawing/2014/main" id="{82846ABA-4A1C-C649-A53C-7AF05B8991CE}"/>
                 </a:ext>
               </a:extLst>
             </p:cNvPr>
-            <p:cNvSpPr txBox="1"/>
+            <p:cNvGrpSpPr/>
             <p:nvPr/>
-          </p:nvSpPr>
+          </p:nvGrpSpPr>
+          <p:grpSpPr>
+            <a:xfrm>
+              <a:off x="1371642" y="5478788"/>
+              <a:ext cx="10031034" cy="486767"/>
+              <a:chOff x="1371642" y="6072555"/>
+              <a:chExt cx="10031034" cy="486767"/>
+            </a:xfrm>
+          </p:grpSpPr>
+          <p:sp>
+            <p:nvSpPr>
+              <p:cNvPr id="20" name="Rectangle 19">
+                <a:extLst>
+                  <a:ext uri="{FF2B5EF4-FFF2-40B4-BE49-F238E27FC236}">
+                    <a16:creationId xmlns:a16="http://schemas.microsoft.com/office/drawing/2014/main" id="{D53A2ECD-D26B-814A-BE47-711905896000}"/>
+                  </a:ext>
+                </a:extLst>
+              </p:cNvPr>
+              <p:cNvSpPr/>
+              <p:nvPr/>
+            </p:nvSpPr>
+            <p:spPr>
+              <a:xfrm>
+                <a:off x="1371642" y="6094142"/>
+                <a:ext cx="1665769" cy="461665"/>
+              </a:xfrm>
+              <a:prstGeom prst="rect">
+                <a:avLst/>
+              </a:prstGeom>
+            </p:spPr>
+            <p:txBody>
+              <a:bodyPr wrap="square">
+                <a:spAutoFit/>
+              </a:bodyPr>
+              <a:lstStyle/>
+              <a:p>
+                <a:r>
+                  <a:rPr lang="de-DE" sz="2400" b="1" dirty="0">
+                    <a:latin typeface="Avenir Book" panose="02000503020000020003" pitchFamily="2" charset="0"/>
+                    <a:cs typeface="AL BAYAN PLAIN" pitchFamily="2" charset="-78"/>
+                  </a:rPr>
+                  <a:t>A: Simple</a:t>
+                </a:r>
+              </a:p>
+            </p:txBody>
+          </p:sp>
+          <p:sp>
+            <p:nvSpPr>
+              <p:cNvPr id="21" name="TextBox 20">
+                <a:extLst>
+                  <a:ext uri="{FF2B5EF4-FFF2-40B4-BE49-F238E27FC236}">
+                    <a16:creationId xmlns:a16="http://schemas.microsoft.com/office/drawing/2014/main" id="{92809091-7F62-3445-A607-AE06BB6F9A59}"/>
+                  </a:ext>
+                </a:extLst>
+              </p:cNvPr>
+              <p:cNvSpPr txBox="1"/>
+              <p:nvPr/>
+            </p:nvSpPr>
+            <p:spPr>
+              <a:xfrm>
+                <a:off x="5331277" y="6097657"/>
+                <a:ext cx="1940412" cy="461665"/>
+              </a:xfrm>
+              <a:prstGeom prst="rect">
+                <a:avLst/>
+              </a:prstGeom>
+              <a:noFill/>
+            </p:spPr>
+            <p:txBody>
+              <a:bodyPr wrap="square" rtlCol="0">
+                <a:spAutoFit/>
+              </a:bodyPr>
+              <a:lstStyle/>
+              <a:p>
+                <a:r>
+                  <a:rPr lang="de-DE" sz="2400" b="1" dirty="0">
+                    <a:latin typeface="Avenir Book" panose="02000503020000020003" pitchFamily="2" charset="0"/>
+                    <a:cs typeface="AL BAYAN PLAIN" pitchFamily="2" charset="-78"/>
+                  </a:rPr>
+                  <a:t>B: Complex</a:t>
+                </a:r>
+                <a:endParaRPr lang="de-DE" sz="2400" dirty="0"/>
+              </a:p>
+            </p:txBody>
+          </p:sp>
+          <p:sp>
+            <p:nvSpPr>
+              <p:cNvPr id="22" name="TextBox 21">
+                <a:extLst>
+                  <a:ext uri="{FF2B5EF4-FFF2-40B4-BE49-F238E27FC236}">
+                    <a16:creationId xmlns:a16="http://schemas.microsoft.com/office/drawing/2014/main" id="{526D47F1-1E94-144C-8D3A-2734A76B9B3A}"/>
+                  </a:ext>
+                </a:extLst>
+              </p:cNvPr>
+              <p:cNvSpPr txBox="1"/>
+              <p:nvPr/>
+            </p:nvSpPr>
+            <p:spPr>
+              <a:xfrm>
+                <a:off x="9462264" y="6072555"/>
+                <a:ext cx="1940412" cy="461665"/>
+              </a:xfrm>
+              <a:prstGeom prst="rect">
+                <a:avLst/>
+              </a:prstGeom>
+              <a:noFill/>
+            </p:spPr>
+            <p:txBody>
+              <a:bodyPr wrap="square" rtlCol="0">
+                <a:spAutoFit/>
+              </a:bodyPr>
+              <a:lstStyle/>
+              <a:p>
+                <a:r>
+                  <a:rPr lang="de-DE" sz="2400" b="1" dirty="0">
+                    <a:latin typeface="Avenir Book" panose="02000503020000020003" pitchFamily="2" charset="0"/>
+                    <a:cs typeface="AL BAYAN PLAIN" pitchFamily="2" charset="-78"/>
+                  </a:rPr>
+                  <a:t>B: Repeated</a:t>
+                </a:r>
+                <a:endParaRPr lang="de-DE" sz="2400" dirty="0"/>
+              </a:p>
+            </p:txBody>
+          </p:sp>
+        </p:grpSp>
+        <p:pic>
+          <p:nvPicPr>
+            <p:cNvPr id="25" name="Picture 24">
+              <a:extLst>
+                <a:ext uri="{FF2B5EF4-FFF2-40B4-BE49-F238E27FC236}">
+                  <a16:creationId xmlns:a16="http://schemas.microsoft.com/office/drawing/2014/main" id="{FD8A7158-A0C5-C943-B179-3311E0EDC5A6}"/>
+                </a:ext>
+              </a:extLst>
+            </p:cNvPr>
+            <p:cNvPicPr>
+              <a:picLocks noChangeAspect="1"/>
+            </p:cNvPicPr>
+            <p:nvPr/>
+          </p:nvPicPr>
+          <p:blipFill>
+            <a:blip r:embed="rId4"/>
+            <a:stretch>
+              <a:fillRect/>
+            </a:stretch>
+          </p:blipFill>
           <p:spPr>
             <a:xfrm>
-              <a:off x="4915644" y="6085782"/>
-              <a:ext cx="1940412" cy="461665"/>
+              <a:off x="8243688" y="1714250"/>
+              <a:ext cx="3120998" cy="3285261"/>
             </a:xfrm>
             <a:prstGeom prst="rect">
               <a:avLst/>
             </a:prstGeom>
-            <a:noFill/>
           </p:spPr>
-          <p:txBody>
-            <a:bodyPr wrap="square" rtlCol="0">
-              <a:spAutoFit/>
-            </a:bodyPr>
-            <a:lstStyle/>
-            <a:p>
-              <a:r>
-                <a:rPr lang="de-DE" sz="2400" b="1" dirty="0">
-                  <a:latin typeface="Avenir Book" panose="02000503020000020003" pitchFamily="2" charset="0"/>
-                  <a:cs typeface="AL BAYAN PLAIN" pitchFamily="2" charset="-78"/>
-                </a:rPr>
-                <a:t>B: Complex</a:t>
-              </a:r>
-              <a:endParaRPr lang="de-DE" sz="2400" dirty="0"/>
-            </a:p>
-          </p:txBody>
-        </p:sp>
-        <p:sp>
-          <p:nvSpPr>
-            <p:cNvPr id="22" name="TextBox 21">
-              <a:extLst>
-                <a:ext uri="{FF2B5EF4-FFF2-40B4-BE49-F238E27FC236}">
-                  <a16:creationId xmlns:a16="http://schemas.microsoft.com/office/drawing/2014/main" id="{526D47F1-1E94-144C-8D3A-2734A76B9B3A}"/>
-                </a:ext>
-              </a:extLst>
-            </p:cNvPr>
-            <p:cNvSpPr txBox="1"/>
-            <p:nvPr/>
-          </p:nvSpPr>
-          <p:spPr>
-            <a:xfrm>
-              <a:off x="9628514" y="6072555"/>
-              <a:ext cx="1940412" cy="461665"/>
-            </a:xfrm>
-            <a:prstGeom prst="rect">
-              <a:avLst/>
-            </a:prstGeom>
-            <a:noFill/>
-          </p:spPr>
-          <p:txBody>
-            <a:bodyPr wrap="square" rtlCol="0">
-              <a:spAutoFit/>
-            </a:bodyPr>
-            <a:lstStyle/>
-            <a:p>
-              <a:r>
-                <a:rPr lang="de-DE" sz="2400" b="1" dirty="0">
-                  <a:latin typeface="Avenir Book" panose="02000503020000020003" pitchFamily="2" charset="0"/>
-                  <a:cs typeface="AL BAYAN PLAIN" pitchFamily="2" charset="-78"/>
-                </a:rPr>
-                <a:t>B: Repeated</a:t>
-              </a:r>
-              <a:endParaRPr lang="de-DE" sz="2400" dirty="0"/>
-            </a:p>
-          </p:txBody>
-        </p:sp>
+        </p:pic>
       </p:grpSp>
-      <p:pic>
-        <p:nvPicPr>
-          <p:cNvPr id="25" name="Picture 24">
-            <a:extLst>
-              <a:ext uri="{FF2B5EF4-FFF2-40B4-BE49-F238E27FC236}">
-                <a16:creationId xmlns:a16="http://schemas.microsoft.com/office/drawing/2014/main" id="{FD8A7158-A0C5-C943-B179-3311E0EDC5A6}"/>
-              </a:ext>
-            </a:extLst>
-          </p:cNvPr>
-          <p:cNvPicPr>
-            <a:picLocks noChangeAspect="1"/>
-          </p:cNvPicPr>
-          <p:nvPr/>
-        </p:nvPicPr>
-        <p:blipFill>
-          <a:blip r:embed="rId4"/>
-          <a:stretch>
-            <a:fillRect/>
-          </a:stretch>
-        </p:blipFill>
-        <p:spPr>
-          <a:xfrm>
-            <a:off x="8243688" y="2308017"/>
-            <a:ext cx="3120998" cy="3285261"/>
-          </a:xfrm>
-          <a:prstGeom prst="rect">
-            <a:avLst/>
-          </a:prstGeom>
-        </p:spPr>
-      </p:pic>
     </p:spTree>
     <p:extLst>
       <p:ext uri="{BB962C8B-B14F-4D97-AF65-F5344CB8AC3E}">

</xml_diff>

<commit_message>
Power Point plots finished
</commit_message>
<xml_diff>
--- a/Plots.pptx
+++ b/Plots.pptx
@@ -9,8 +9,8 @@
   </p:notesMasterIdLst>
   <p:sldIdLst>
     <p:sldId id="256" r:id="rId2"/>
-    <p:sldId id="257" r:id="rId3"/>
-    <p:sldId id="258" r:id="rId4"/>
+    <p:sldId id="258" r:id="rId3"/>
+    <p:sldId id="257" r:id="rId4"/>
   </p:sldIdLst>
   <p:sldSz cx="12192000" cy="6858000"/>
   <p:notesSz cx="6858000" cy="9144000"/>
@@ -4569,6 +4569,291 @@
           <a:chExt cx="0" cy="0"/>
         </a:xfrm>
       </p:grpSpPr>
+      <p:pic>
+        <p:nvPicPr>
+          <p:cNvPr id="11" name="Picture 10">
+            <a:extLst>
+              <a:ext uri="{FF2B5EF4-FFF2-40B4-BE49-F238E27FC236}">
+                <a16:creationId xmlns:a16="http://schemas.microsoft.com/office/drawing/2014/main" id="{365794A1-5816-DE45-8840-31B000EFCDA0}"/>
+              </a:ext>
+            </a:extLst>
+          </p:cNvPr>
+          <p:cNvPicPr>
+            <a:picLocks noChangeAspect="1"/>
+          </p:cNvPicPr>
+          <p:nvPr/>
+        </p:nvPicPr>
+        <p:blipFill>
+          <a:blip r:embed="rId2"/>
+          <a:stretch>
+            <a:fillRect/>
+          </a:stretch>
+        </p:blipFill>
+        <p:spPr>
+          <a:xfrm>
+            <a:off x="144914" y="1720441"/>
+            <a:ext cx="3637154" cy="3826486"/>
+          </a:xfrm>
+          <a:prstGeom prst="rect">
+            <a:avLst/>
+          </a:prstGeom>
+        </p:spPr>
+      </p:pic>
+      <p:pic>
+        <p:nvPicPr>
+          <p:cNvPr id="12" name="Picture 11">
+            <a:extLst>
+              <a:ext uri="{FF2B5EF4-FFF2-40B4-BE49-F238E27FC236}">
+                <a16:creationId xmlns:a16="http://schemas.microsoft.com/office/drawing/2014/main" id="{62B02E1D-1212-E845-9BC8-6676B9072BE1}"/>
+              </a:ext>
+            </a:extLst>
+          </p:cNvPr>
+          <p:cNvPicPr>
+            <a:picLocks noChangeAspect="1"/>
+          </p:cNvPicPr>
+          <p:nvPr/>
+        </p:nvPicPr>
+        <p:blipFill>
+          <a:blip r:embed="rId3"/>
+          <a:stretch>
+            <a:fillRect/>
+          </a:stretch>
+        </p:blipFill>
+        <p:spPr>
+          <a:xfrm>
+            <a:off x="4060078" y="1741329"/>
+            <a:ext cx="3616679" cy="3826486"/>
+          </a:xfrm>
+          <a:prstGeom prst="rect">
+            <a:avLst/>
+          </a:prstGeom>
+        </p:spPr>
+      </p:pic>
+      <p:pic>
+        <p:nvPicPr>
+          <p:cNvPr id="13" name="Picture 12">
+            <a:extLst>
+              <a:ext uri="{FF2B5EF4-FFF2-40B4-BE49-F238E27FC236}">
+                <a16:creationId xmlns:a16="http://schemas.microsoft.com/office/drawing/2014/main" id="{14353566-38B9-8F42-AECD-E2038929E841}"/>
+              </a:ext>
+            </a:extLst>
+          </p:cNvPr>
+          <p:cNvPicPr>
+            <a:picLocks noChangeAspect="1"/>
+          </p:cNvPicPr>
+          <p:nvPr/>
+        </p:nvPicPr>
+        <p:blipFill>
+          <a:blip r:embed="rId4"/>
+          <a:stretch>
+            <a:fillRect/>
+          </a:stretch>
+        </p:blipFill>
+        <p:spPr>
+          <a:xfrm>
+            <a:off x="8175507" y="1766061"/>
+            <a:ext cx="3616679" cy="3766129"/>
+          </a:xfrm>
+          <a:prstGeom prst="rect">
+            <a:avLst/>
+          </a:prstGeom>
+        </p:spPr>
+      </p:pic>
+      <p:sp>
+        <p:nvSpPr>
+          <p:cNvPr id="14" name="Rectangle 13">
+            <a:extLst>
+              <a:ext uri="{FF2B5EF4-FFF2-40B4-BE49-F238E27FC236}">
+                <a16:creationId xmlns:a16="http://schemas.microsoft.com/office/drawing/2014/main" id="{54F0576E-611E-B444-8929-6CFFC849EF28}"/>
+              </a:ext>
+            </a:extLst>
+          </p:cNvPr>
+          <p:cNvSpPr/>
+          <p:nvPr/>
+        </p:nvSpPr>
+        <p:spPr>
+          <a:xfrm>
+            <a:off x="2107906" y="5962040"/>
+            <a:ext cx="1665769" cy="461665"/>
+          </a:xfrm>
+          <a:prstGeom prst="rect">
+            <a:avLst/>
+          </a:prstGeom>
+        </p:spPr>
+        <p:txBody>
+          <a:bodyPr wrap="square">
+            <a:spAutoFit/>
+          </a:bodyPr>
+          <a:lstStyle/>
+          <a:p>
+            <a:r>
+              <a:rPr lang="de-DE" sz="2400" b="1" dirty="0">
+                <a:latin typeface="Avenir Book" panose="02000503020000020003" pitchFamily="2" charset="0"/>
+                <a:cs typeface="AL BAYAN PLAIN" pitchFamily="2" charset="-78"/>
+              </a:rPr>
+              <a:t>Simple</a:t>
+            </a:r>
+          </a:p>
+        </p:txBody>
+      </p:sp>
+      <p:sp>
+        <p:nvSpPr>
+          <p:cNvPr id="15" name="TextBox 14">
+            <a:extLst>
+              <a:ext uri="{FF2B5EF4-FFF2-40B4-BE49-F238E27FC236}">
+                <a16:creationId xmlns:a16="http://schemas.microsoft.com/office/drawing/2014/main" id="{9A6D7318-D6D0-A64F-9EE1-F020FCB4D720}"/>
+              </a:ext>
+            </a:extLst>
+          </p:cNvPr>
+          <p:cNvSpPr txBox="1"/>
+          <p:nvPr/>
+        </p:nvSpPr>
+        <p:spPr>
+          <a:xfrm>
+            <a:off x="5831682" y="5962040"/>
+            <a:ext cx="1940412" cy="461665"/>
+          </a:xfrm>
+          <a:prstGeom prst="rect">
+            <a:avLst/>
+          </a:prstGeom>
+          <a:noFill/>
+        </p:spPr>
+        <p:txBody>
+          <a:bodyPr wrap="square" rtlCol="0">
+            <a:spAutoFit/>
+          </a:bodyPr>
+          <a:lstStyle/>
+          <a:p>
+            <a:r>
+              <a:rPr lang="de-DE" sz="2400" b="1" dirty="0">
+                <a:latin typeface="Avenir Book" panose="02000503020000020003" pitchFamily="2" charset="0"/>
+                <a:cs typeface="AL BAYAN PLAIN" pitchFamily="2" charset="-78"/>
+              </a:rPr>
+              <a:t>Complex</a:t>
+            </a:r>
+            <a:endParaRPr lang="de-DE" sz="2400" dirty="0"/>
+          </a:p>
+        </p:txBody>
+      </p:sp>
+      <p:sp>
+        <p:nvSpPr>
+          <p:cNvPr id="16" name="TextBox 15">
+            <a:extLst>
+              <a:ext uri="{FF2B5EF4-FFF2-40B4-BE49-F238E27FC236}">
+                <a16:creationId xmlns:a16="http://schemas.microsoft.com/office/drawing/2014/main" id="{1CD5248E-0979-F24E-82A7-94B013C4076B}"/>
+              </a:ext>
+            </a:extLst>
+          </p:cNvPr>
+          <p:cNvSpPr txBox="1"/>
+          <p:nvPr/>
+        </p:nvSpPr>
+        <p:spPr>
+          <a:xfrm>
+            <a:off x="9986057" y="5960065"/>
+            <a:ext cx="1940412" cy="461665"/>
+          </a:xfrm>
+          <a:prstGeom prst="rect">
+            <a:avLst/>
+          </a:prstGeom>
+          <a:noFill/>
+        </p:spPr>
+        <p:txBody>
+          <a:bodyPr wrap="square" rtlCol="0">
+            <a:spAutoFit/>
+          </a:bodyPr>
+          <a:lstStyle/>
+          <a:p>
+            <a:r>
+              <a:rPr lang="de-DE" sz="2400" b="1" dirty="0">
+                <a:latin typeface="Avenir Book" panose="02000503020000020003" pitchFamily="2" charset="0"/>
+                <a:cs typeface="AL BAYAN PLAIN" pitchFamily="2" charset="-78"/>
+              </a:rPr>
+              <a:t>Repeated</a:t>
+            </a:r>
+            <a:endParaRPr lang="de-DE" sz="2400" dirty="0"/>
+          </a:p>
+        </p:txBody>
+      </p:sp>
+      <p:sp>
+        <p:nvSpPr>
+          <p:cNvPr id="17" name="Rectangle 16">
+            <a:extLst>
+              <a:ext uri="{FF2B5EF4-FFF2-40B4-BE49-F238E27FC236}">
+                <a16:creationId xmlns:a16="http://schemas.microsoft.com/office/drawing/2014/main" id="{30D1C1AB-BC88-1347-B069-284067C905C7}"/>
+              </a:ext>
+            </a:extLst>
+          </p:cNvPr>
+          <p:cNvSpPr/>
+          <p:nvPr/>
+        </p:nvSpPr>
+        <p:spPr>
+          <a:xfrm>
+            <a:off x="1648691" y="286735"/>
+            <a:ext cx="8894617" cy="646331"/>
+          </a:xfrm>
+          <a:prstGeom prst="rect">
+            <a:avLst/>
+          </a:prstGeom>
+        </p:spPr>
+        <p:txBody>
+          <a:bodyPr wrap="square">
+            <a:spAutoFit/>
+          </a:bodyPr>
+          <a:lstStyle/>
+          <a:p>
+            <a:pPr algn="ctr"/>
+            <a:r>
+              <a:rPr lang="en-GB" b="1" dirty="0">
+                <a:solidFill>
+                  <a:srgbClr val="000000"/>
+                </a:solidFill>
+                <a:latin typeface="Arial" panose="020B0604020202020204" pitchFamily="34" charset="0"/>
+              </a:rPr>
+              <a:t> </a:t>
+            </a:r>
+            <a:r>
+              <a:rPr lang="en-GB" dirty="0">
+                <a:solidFill>
+                  <a:srgbClr val="000000"/>
+                </a:solidFill>
+                <a:latin typeface="Arial" panose="020B0604020202020204" pitchFamily="34" charset="0"/>
+              </a:rPr>
+              <a:t>Is a remote informed consent in accordance with the legal requirements for simple, complex or repeated anaesthesia?</a:t>
+            </a:r>
+            <a:endParaRPr lang="de-DE" dirty="0"/>
+          </a:p>
+        </p:txBody>
+      </p:sp>
+    </p:spTree>
+    <p:extLst>
+      <p:ext uri="{BB962C8B-B14F-4D97-AF65-F5344CB8AC3E}">
+        <p14:creationId xmlns:p14="http://schemas.microsoft.com/office/powerpoint/2010/main" val="2484953679"/>
+      </p:ext>
+    </p:extLst>
+  </p:cSld>
+  <p:clrMapOvr>
+    <a:masterClrMapping/>
+  </p:clrMapOvr>
+</p:sld>
+</file>
+
+<file path=ppt/slides/slide3.xml><?xml version="1.0" encoding="utf-8"?>
+<p:sld xmlns:a="http://schemas.openxmlformats.org/drawingml/2006/main" xmlns:r="http://schemas.openxmlformats.org/officeDocument/2006/relationships" xmlns:p="http://schemas.openxmlformats.org/presentationml/2006/main">
+  <p:cSld>
+    <p:spTree>
+      <p:nvGrpSpPr>
+        <p:cNvPr id="1" name=""/>
+        <p:cNvGrpSpPr/>
+        <p:nvPr/>
+      </p:nvGrpSpPr>
+      <p:grpSpPr>
+        <a:xfrm>
+          <a:off x="0" y="0"/>
+          <a:ext cx="0" cy="0"/>
+          <a:chOff x="0" y="0"/>
+          <a:chExt cx="0" cy="0"/>
+        </a:xfrm>
+      </p:grpSpPr>
       <p:grpSp>
         <p:nvGrpSpPr>
           <p:cNvPr id="26" name="Group 25">
@@ -4583,10 +4868,10 @@
         </p:nvGrpSpPr>
         <p:grpSpPr>
           <a:xfrm>
-            <a:off x="-16151" y="256193"/>
-            <a:ext cx="11418827" cy="5709362"/>
-            <a:chOff x="-16151" y="256193"/>
-            <a:chExt cx="11418827" cy="5709362"/>
+            <a:off x="470731" y="256193"/>
+            <a:ext cx="10110175" cy="6167512"/>
+            <a:chOff x="340106" y="256193"/>
+            <a:chExt cx="10110175" cy="6167512"/>
           </a:xfrm>
         </p:grpSpPr>
         <p:pic>
@@ -4611,8 +4896,8 @@
           </p:blipFill>
           <p:spPr>
             <a:xfrm>
-              <a:off x="-16151" y="1698171"/>
-              <a:ext cx="4017078" cy="3301340"/>
+              <a:off x="340106" y="1602975"/>
+              <a:ext cx="4730657" cy="3887778"/>
             </a:xfrm>
             <a:prstGeom prst="rect">
               <a:avLst/>
@@ -4641,8 +4926,8 @@
           </p:blipFill>
           <p:spPr>
             <a:xfrm>
-              <a:off x="4086928" y="1714251"/>
-              <a:ext cx="3893290" cy="3273386"/>
+              <a:off x="5903841" y="1668214"/>
+              <a:ext cx="4546440" cy="3822539"/>
             </a:xfrm>
             <a:prstGeom prst="rect">
               <a:avLst/>
@@ -4681,7 +4966,7 @@
                 <a:rPr lang="en-GB" dirty="0">
                   <a:latin typeface="Calibri" panose="020F0502020204030204" pitchFamily="34" charset="0"/>
                 </a:rPr>
-                <a:t>When do you need to obtain Informed consent for elective surgery based on legal requirements in elective an repeated anaesthesia?</a:t>
+                <a:t>When do you need to obtain Informed consent for elective surgery based on legal requirements in elective and repeated anaesthesia?</a:t>
               </a:r>
               <a:endParaRPr lang="de-DE" dirty="0"/>
             </a:p>
@@ -4701,10 +4986,10 @@
           </p:nvGrpSpPr>
           <p:grpSpPr>
             <a:xfrm>
-              <a:off x="1371642" y="5478788"/>
-              <a:ext cx="10031034" cy="486767"/>
-              <a:chOff x="1371642" y="6072555"/>
-              <a:chExt cx="10031034" cy="486767"/>
+              <a:off x="2939181" y="5962040"/>
+              <a:ext cx="7196110" cy="461665"/>
+              <a:chOff x="2939181" y="6555807"/>
+              <a:chExt cx="7196110" cy="461665"/>
             </a:xfrm>
           </p:grpSpPr>
           <p:sp>
@@ -4721,7 +5006,7 @@
             </p:nvSpPr>
             <p:spPr>
               <a:xfrm>
-                <a:off x="1371642" y="6094142"/>
+                <a:off x="2939181" y="6555807"/>
                 <a:ext cx="1665769" cy="461665"/>
               </a:xfrm>
               <a:prstGeom prst="rect">
@@ -4739,7 +5024,7 @@
                     <a:latin typeface="Avenir Book" panose="02000503020000020003" pitchFamily="2" charset="0"/>
                     <a:cs typeface="AL BAYAN PLAIN" pitchFamily="2" charset="-78"/>
                   </a:rPr>
-                  <a:t>A: Simple</a:t>
+                  <a:t>Simple</a:t>
                 </a:r>
               </a:p>
             </p:txBody>
@@ -4758,7 +5043,7 @@
             </p:nvSpPr>
             <p:spPr>
               <a:xfrm>
-                <a:off x="5331277" y="6097657"/>
+                <a:off x="8194879" y="6555807"/>
                 <a:ext cx="1940412" cy="461665"/>
               </a:xfrm>
               <a:prstGeom prst="rect">
@@ -4777,253 +5062,18 @@
                     <a:latin typeface="Avenir Book" panose="02000503020000020003" pitchFamily="2" charset="0"/>
                     <a:cs typeface="AL BAYAN PLAIN" pitchFamily="2" charset="-78"/>
                   </a:rPr>
-                  <a:t>B: Complex</a:t>
-                </a:r>
-                <a:endParaRPr lang="de-DE" sz="2400" dirty="0"/>
-              </a:p>
-            </p:txBody>
-          </p:sp>
-          <p:sp>
-            <p:nvSpPr>
-              <p:cNvPr id="22" name="TextBox 21">
-                <a:extLst>
-                  <a:ext uri="{FF2B5EF4-FFF2-40B4-BE49-F238E27FC236}">
-                    <a16:creationId xmlns:a16="http://schemas.microsoft.com/office/drawing/2014/main" id="{526D47F1-1E94-144C-8D3A-2734A76B9B3A}"/>
-                  </a:ext>
-                </a:extLst>
-              </p:cNvPr>
-              <p:cNvSpPr txBox="1"/>
-              <p:nvPr/>
-            </p:nvSpPr>
-            <p:spPr>
-              <a:xfrm>
-                <a:off x="9462264" y="6072555"/>
-                <a:ext cx="1940412" cy="461665"/>
-              </a:xfrm>
-              <a:prstGeom prst="rect">
-                <a:avLst/>
-              </a:prstGeom>
-              <a:noFill/>
-            </p:spPr>
-            <p:txBody>
-              <a:bodyPr wrap="square" rtlCol="0">
-                <a:spAutoFit/>
-              </a:bodyPr>
-              <a:lstStyle/>
-              <a:p>
-                <a:r>
-                  <a:rPr lang="de-DE" sz="2400" b="1" dirty="0">
-                    <a:latin typeface="Avenir Book" panose="02000503020000020003" pitchFamily="2" charset="0"/>
-                    <a:cs typeface="AL BAYAN PLAIN" pitchFamily="2" charset="-78"/>
-                  </a:rPr>
-                  <a:t>B: Repeated</a:t>
+                  <a:t>Complex</a:t>
                 </a:r>
                 <a:endParaRPr lang="de-DE" sz="2400" dirty="0"/>
               </a:p>
             </p:txBody>
           </p:sp>
         </p:grpSp>
-        <p:pic>
-          <p:nvPicPr>
-            <p:cNvPr id="25" name="Picture 24">
-              <a:extLst>
-                <a:ext uri="{FF2B5EF4-FFF2-40B4-BE49-F238E27FC236}">
-                  <a16:creationId xmlns:a16="http://schemas.microsoft.com/office/drawing/2014/main" id="{FD8A7158-A0C5-C943-B179-3311E0EDC5A6}"/>
-                </a:ext>
-              </a:extLst>
-            </p:cNvPr>
-            <p:cNvPicPr>
-              <a:picLocks noChangeAspect="1"/>
-            </p:cNvPicPr>
-            <p:nvPr/>
-          </p:nvPicPr>
-          <p:blipFill>
-            <a:blip r:embed="rId4"/>
-            <a:stretch>
-              <a:fillRect/>
-            </a:stretch>
-          </p:blipFill>
-          <p:spPr>
-            <a:xfrm>
-              <a:off x="8243688" y="1714250"/>
-              <a:ext cx="3120998" cy="3285261"/>
-            </a:xfrm>
-            <a:prstGeom prst="rect">
-              <a:avLst/>
-            </a:prstGeom>
-          </p:spPr>
-        </p:pic>
       </p:grpSp>
     </p:spTree>
     <p:extLst>
       <p:ext uri="{BB962C8B-B14F-4D97-AF65-F5344CB8AC3E}">
         <p14:creationId xmlns:p14="http://schemas.microsoft.com/office/powerpoint/2010/main" val="2516805712"/>
-      </p:ext>
-    </p:extLst>
-  </p:cSld>
-  <p:clrMapOvr>
-    <a:masterClrMapping/>
-  </p:clrMapOvr>
-</p:sld>
-</file>
-
-<file path=ppt/slides/slide3.xml><?xml version="1.0" encoding="utf-8"?>
-<p:sld xmlns:a="http://schemas.openxmlformats.org/drawingml/2006/main" xmlns:r="http://schemas.openxmlformats.org/officeDocument/2006/relationships" xmlns:p="http://schemas.openxmlformats.org/presentationml/2006/main">
-  <p:cSld>
-    <p:spTree>
-      <p:nvGrpSpPr>
-        <p:cNvPr id="1" name=""/>
-        <p:cNvGrpSpPr/>
-        <p:nvPr/>
-      </p:nvGrpSpPr>
-      <p:grpSpPr>
-        <a:xfrm>
-          <a:off x="0" y="0"/>
-          <a:ext cx="0" cy="0"/>
-          <a:chOff x="0" y="0"/>
-          <a:chExt cx="0" cy="0"/>
-        </a:xfrm>
-      </p:grpSpPr>
-      <p:grpSp>
-        <p:nvGrpSpPr>
-          <p:cNvPr id="8" name="Group 7">
-            <a:extLst>
-              <a:ext uri="{FF2B5EF4-FFF2-40B4-BE49-F238E27FC236}">
-                <a16:creationId xmlns:a16="http://schemas.microsoft.com/office/drawing/2014/main" id="{64574DB7-375D-6542-AE6E-E1537B429C90}"/>
-              </a:ext>
-            </a:extLst>
-          </p:cNvPr>
-          <p:cNvGrpSpPr/>
-          <p:nvPr/>
-        </p:nvGrpSpPr>
-        <p:grpSpPr>
-          <a:xfrm>
-            <a:off x="421619" y="6072555"/>
-            <a:ext cx="11147307" cy="483252"/>
-            <a:chOff x="421619" y="6072555"/>
-            <a:chExt cx="11147307" cy="483252"/>
-          </a:xfrm>
-        </p:grpSpPr>
-        <p:sp>
-          <p:nvSpPr>
-            <p:cNvPr id="5" name="Rectangle 4">
-              <a:extLst>
-                <a:ext uri="{FF2B5EF4-FFF2-40B4-BE49-F238E27FC236}">
-                  <a16:creationId xmlns:a16="http://schemas.microsoft.com/office/drawing/2014/main" id="{F24D2514-119C-A948-90E6-6E0323600939}"/>
-                </a:ext>
-              </a:extLst>
-            </p:cNvPr>
-            <p:cNvSpPr/>
-            <p:nvPr/>
-          </p:nvSpPr>
-          <p:spPr>
-            <a:xfrm>
-              <a:off x="421619" y="6094142"/>
-              <a:ext cx="1665769" cy="461665"/>
-            </a:xfrm>
-            <a:prstGeom prst="rect">
-              <a:avLst/>
-            </a:prstGeom>
-          </p:spPr>
-          <p:txBody>
-            <a:bodyPr wrap="square">
-              <a:spAutoFit/>
-            </a:bodyPr>
-            <a:lstStyle/>
-            <a:p>
-              <a:r>
-                <a:rPr lang="de-DE" sz="2400" b="1" dirty="0">
-                  <a:latin typeface="Avenir Book" panose="02000503020000020003" pitchFamily="2" charset="0"/>
-                  <a:cs typeface="AL BAYAN PLAIN" pitchFamily="2" charset="-78"/>
-                </a:rPr>
-                <a:t>A: Simple</a:t>
-              </a:r>
-            </a:p>
-          </p:txBody>
-        </p:sp>
-        <p:sp>
-          <p:nvSpPr>
-            <p:cNvPr id="6" name="TextBox 5">
-              <a:extLst>
-                <a:ext uri="{FF2B5EF4-FFF2-40B4-BE49-F238E27FC236}">
-                  <a16:creationId xmlns:a16="http://schemas.microsoft.com/office/drawing/2014/main" id="{32FB111E-6932-C546-B39B-234059FCB1D4}"/>
-                </a:ext>
-              </a:extLst>
-            </p:cNvPr>
-            <p:cNvSpPr txBox="1"/>
-            <p:nvPr/>
-          </p:nvSpPr>
-          <p:spPr>
-            <a:xfrm>
-              <a:off x="4915644" y="6085782"/>
-              <a:ext cx="1940412" cy="461665"/>
-            </a:xfrm>
-            <a:prstGeom prst="rect">
-              <a:avLst/>
-            </a:prstGeom>
-            <a:noFill/>
-          </p:spPr>
-          <p:txBody>
-            <a:bodyPr wrap="square" rtlCol="0">
-              <a:spAutoFit/>
-            </a:bodyPr>
-            <a:lstStyle/>
-            <a:p>
-              <a:r>
-                <a:rPr lang="de-DE" sz="2400" b="1" dirty="0">
-                  <a:latin typeface="Avenir Book" panose="02000503020000020003" pitchFamily="2" charset="0"/>
-                  <a:cs typeface="AL BAYAN PLAIN" pitchFamily="2" charset="-78"/>
-                </a:rPr>
-                <a:t>B: Complex</a:t>
-              </a:r>
-              <a:endParaRPr lang="de-DE" sz="2400" dirty="0"/>
-            </a:p>
-          </p:txBody>
-        </p:sp>
-        <p:sp>
-          <p:nvSpPr>
-            <p:cNvPr id="7" name="TextBox 6">
-              <a:extLst>
-                <a:ext uri="{FF2B5EF4-FFF2-40B4-BE49-F238E27FC236}">
-                  <a16:creationId xmlns:a16="http://schemas.microsoft.com/office/drawing/2014/main" id="{204CA997-5AF7-9C47-A882-C70AF438E5ED}"/>
-                </a:ext>
-              </a:extLst>
-            </p:cNvPr>
-            <p:cNvSpPr txBox="1"/>
-            <p:nvPr/>
-          </p:nvSpPr>
-          <p:spPr>
-            <a:xfrm>
-              <a:off x="9628514" y="6072555"/>
-              <a:ext cx="1940412" cy="461665"/>
-            </a:xfrm>
-            <a:prstGeom prst="rect">
-              <a:avLst/>
-            </a:prstGeom>
-            <a:noFill/>
-          </p:spPr>
-          <p:txBody>
-            <a:bodyPr wrap="square" rtlCol="0">
-              <a:spAutoFit/>
-            </a:bodyPr>
-            <a:lstStyle/>
-            <a:p>
-              <a:r>
-                <a:rPr lang="de-DE" sz="2400" b="1" dirty="0">
-                  <a:latin typeface="Avenir Book" panose="02000503020000020003" pitchFamily="2" charset="0"/>
-                  <a:cs typeface="AL BAYAN PLAIN" pitchFamily="2" charset="-78"/>
-                </a:rPr>
-                <a:t>B: Repeated</a:t>
-              </a:r>
-              <a:endParaRPr lang="de-DE" sz="2400" dirty="0"/>
-            </a:p>
-          </p:txBody>
-        </p:sp>
-      </p:grpSp>
-    </p:spTree>
-    <p:extLst>
-      <p:ext uri="{BB962C8B-B14F-4D97-AF65-F5344CB8AC3E}">
-        <p14:creationId xmlns:p14="http://schemas.microsoft.com/office/powerpoint/2010/main" val="2484953679"/>
       </p:ext>
     </p:extLst>
   </p:cSld>

</xml_diff>

<commit_message>
fixed minor errors in plots
</commit_message>
<xml_diff>
--- a/Plots.pptx
+++ b/Plots.pptx
@@ -109,6 +109,11 @@
       </a:defRPr>
     </a:lvl9pPr>
   </p:defaultTextStyle>
+  <p:extLst>
+    <p:ext uri="{EFAFB233-063F-42B5-8137-9DF3F51BA10A}">
+      <p15:sldGuideLst xmlns:p15="http://schemas.microsoft.com/office/powerpoint/2012/main"/>
+    </p:ext>
+  </p:extLst>
 </p:presentation>
 </file>
 
@@ -194,7 +199,7 @@
           <a:p>
             <a:fld id="{15C2EBE1-C605-144D-906C-CCD574CF72BF}" type="datetimeFigureOut">
               <a:rPr lang="de-DE" smtClean="0"/>
-              <a:t>04.04.22</a:t>
+              <a:t>14.04.22</a:t>
             </a:fld>
             <a:endParaRPr lang="de-DE"/>
           </a:p>
@@ -739,7 +744,7 @@
           <a:p>
             <a:fld id="{200276FF-7F20-CD40-8287-D8545D8CF22C}" type="datetimeFigureOut">
               <a:rPr lang="de-DE" smtClean="0"/>
-              <a:t>04.04.22</a:t>
+              <a:t>14.04.22</a:t>
             </a:fld>
             <a:endParaRPr lang="de-DE"/>
           </a:p>
@@ -939,7 +944,7 @@
           <a:p>
             <a:fld id="{200276FF-7F20-CD40-8287-D8545D8CF22C}" type="datetimeFigureOut">
               <a:rPr lang="de-DE" smtClean="0"/>
-              <a:t>04.04.22</a:t>
+              <a:t>14.04.22</a:t>
             </a:fld>
             <a:endParaRPr lang="de-DE"/>
           </a:p>
@@ -1149,7 +1154,7 @@
           <a:p>
             <a:fld id="{200276FF-7F20-CD40-8287-D8545D8CF22C}" type="datetimeFigureOut">
               <a:rPr lang="de-DE" smtClean="0"/>
-              <a:t>04.04.22</a:t>
+              <a:t>14.04.22</a:t>
             </a:fld>
             <a:endParaRPr lang="de-DE"/>
           </a:p>
@@ -1349,7 +1354,7 @@
           <a:p>
             <a:fld id="{200276FF-7F20-CD40-8287-D8545D8CF22C}" type="datetimeFigureOut">
               <a:rPr lang="de-DE" smtClean="0"/>
-              <a:t>04.04.22</a:t>
+              <a:t>14.04.22</a:t>
             </a:fld>
             <a:endParaRPr lang="de-DE"/>
           </a:p>
@@ -1625,7 +1630,7 @@
           <a:p>
             <a:fld id="{200276FF-7F20-CD40-8287-D8545D8CF22C}" type="datetimeFigureOut">
               <a:rPr lang="de-DE" smtClean="0"/>
-              <a:t>04.04.22</a:t>
+              <a:t>14.04.22</a:t>
             </a:fld>
             <a:endParaRPr lang="de-DE"/>
           </a:p>
@@ -1893,7 +1898,7 @@
           <a:p>
             <a:fld id="{200276FF-7F20-CD40-8287-D8545D8CF22C}" type="datetimeFigureOut">
               <a:rPr lang="de-DE" smtClean="0"/>
-              <a:t>04.04.22</a:t>
+              <a:t>14.04.22</a:t>
             </a:fld>
             <a:endParaRPr lang="de-DE"/>
           </a:p>
@@ -2308,7 +2313,7 @@
           <a:p>
             <a:fld id="{200276FF-7F20-CD40-8287-D8545D8CF22C}" type="datetimeFigureOut">
               <a:rPr lang="de-DE" smtClean="0"/>
-              <a:t>04.04.22</a:t>
+              <a:t>14.04.22</a:t>
             </a:fld>
             <a:endParaRPr lang="de-DE"/>
           </a:p>
@@ -2450,7 +2455,7 @@
           <a:p>
             <a:fld id="{200276FF-7F20-CD40-8287-D8545D8CF22C}" type="datetimeFigureOut">
               <a:rPr lang="de-DE" smtClean="0"/>
-              <a:t>04.04.22</a:t>
+              <a:t>14.04.22</a:t>
             </a:fld>
             <a:endParaRPr lang="de-DE"/>
           </a:p>
@@ -2563,7 +2568,7 @@
           <a:p>
             <a:fld id="{200276FF-7F20-CD40-8287-D8545D8CF22C}" type="datetimeFigureOut">
               <a:rPr lang="de-DE" smtClean="0"/>
-              <a:t>04.04.22</a:t>
+              <a:t>14.04.22</a:t>
             </a:fld>
             <a:endParaRPr lang="de-DE"/>
           </a:p>
@@ -2876,7 +2881,7 @@
           <a:p>
             <a:fld id="{200276FF-7F20-CD40-8287-D8545D8CF22C}" type="datetimeFigureOut">
               <a:rPr lang="de-DE" smtClean="0"/>
-              <a:t>04.04.22</a:t>
+              <a:t>14.04.22</a:t>
             </a:fld>
             <a:endParaRPr lang="de-DE"/>
           </a:p>
@@ -3165,7 +3170,7 @@
           <a:p>
             <a:fld id="{200276FF-7F20-CD40-8287-D8545D8CF22C}" type="datetimeFigureOut">
               <a:rPr lang="de-DE" smtClean="0"/>
-              <a:t>04.04.22</a:t>
+              <a:t>14.04.22</a:t>
             </a:fld>
             <a:endParaRPr lang="de-DE"/>
           </a:p>
@@ -3408,7 +3413,7 @@
           <a:p>
             <a:fld id="{200276FF-7F20-CD40-8287-D8545D8CF22C}" type="datetimeFigureOut">
               <a:rPr lang="de-DE" smtClean="0"/>
-              <a:t>04.04.22</a:t>
+              <a:t>14.04.22</a:t>
             </a:fld>
             <a:endParaRPr lang="de-DE"/>
           </a:p>
@@ -4527,14 +4532,14 @@
             </a:pPr>
             <a:r>
               <a:rPr lang="en-GB" dirty="0">
-                <a:latin typeface="Avenir Book" panose="02000503020000020003" pitchFamily="2" charset="0"/>
-                <a:cs typeface="Al Bayan Plain" pitchFamily="2" charset="-78"/>
+                <a:latin typeface="Arial" panose="020B0604020202020204" pitchFamily="34" charset="0"/>
+                <a:cs typeface="Arial" panose="020B0604020202020204" pitchFamily="34" charset="0"/>
               </a:rPr>
               <a:t>Is it possible to obtain informed consent online via internet/telefone in your routine setting? </a:t>
             </a:r>
             <a:endParaRPr lang="de-DE" dirty="0">
-              <a:latin typeface="Avenir Book" panose="02000503020000020003" pitchFamily="2" charset="0"/>
-              <a:cs typeface="Al Bayan Plain" pitchFamily="2" charset="-78"/>
+              <a:latin typeface="Arial" panose="020B0604020202020204" pitchFamily="34" charset="0"/>
+              <a:cs typeface="Arial" panose="020B0604020202020204" pitchFamily="34" charset="0"/>
             </a:endParaRPr>
           </a:p>
         </p:txBody>
@@ -4591,7 +4596,7 @@
         </p:blipFill>
         <p:spPr>
           <a:xfrm>
-            <a:off x="144914" y="1720441"/>
+            <a:off x="144914" y="1583811"/>
             <a:ext cx="3637154" cy="3826486"/>
           </a:xfrm>
           <a:prstGeom prst="rect">
@@ -4621,7 +4626,7 @@
         </p:blipFill>
         <p:spPr>
           <a:xfrm>
-            <a:off x="4095703" y="1741329"/>
+            <a:off x="4095703" y="1604699"/>
             <a:ext cx="3616679" cy="3826486"/>
           </a:xfrm>
           <a:prstGeom prst="rect">
@@ -4651,7 +4656,7 @@
         </p:blipFill>
         <p:spPr>
           <a:xfrm>
-            <a:off x="8175507" y="1766061"/>
+            <a:off x="8175507" y="1629431"/>
             <a:ext cx="3616679" cy="3766129"/>
           </a:xfrm>
           <a:prstGeom prst="rect">
@@ -4868,10 +4873,10 @@
         </p:nvGrpSpPr>
         <p:grpSpPr>
           <a:xfrm>
-            <a:off x="470731" y="256193"/>
-            <a:ext cx="10110175" cy="6167512"/>
-            <a:chOff x="340106" y="256193"/>
-            <a:chExt cx="10110175" cy="6167512"/>
+            <a:off x="470731" y="445380"/>
+            <a:ext cx="10110175" cy="6209552"/>
+            <a:chOff x="340106" y="214153"/>
+            <a:chExt cx="10110175" cy="6209552"/>
           </a:xfrm>
         </p:grpSpPr>
         <p:pic>
@@ -4896,7 +4901,7 @@
           </p:blipFill>
           <p:spPr>
             <a:xfrm>
-              <a:off x="340106" y="1602975"/>
+              <a:off x="340106" y="1529405"/>
               <a:ext cx="4730657" cy="3887778"/>
             </a:xfrm>
             <a:prstGeom prst="rect">
@@ -4926,7 +4931,7 @@
           </p:blipFill>
           <p:spPr>
             <a:xfrm>
-              <a:off x="5903841" y="1668214"/>
+              <a:off x="5903841" y="1594644"/>
               <a:ext cx="4546440" cy="3822539"/>
             </a:xfrm>
             <a:prstGeom prst="rect">
@@ -4948,8 +4953,8 @@
           </p:nvSpPr>
           <p:spPr>
             <a:xfrm>
-              <a:off x="1371642" y="256193"/>
-              <a:ext cx="9057988" cy="646331"/>
+              <a:off x="1371642" y="214153"/>
+              <a:ext cx="9057988" cy="923330"/>
             </a:xfrm>
             <a:prstGeom prst="rect">
               <a:avLst/>
@@ -4963,12 +4968,16 @@
             <a:p>
               <a:pPr algn="ctr"/>
               <a:r>
-                <a:rPr lang="en-GB" dirty="0">
-                  <a:latin typeface="Calibri" panose="020F0502020204030204" pitchFamily="34" charset="0"/>
-                </a:rPr>
-                <a:t>When do you need to obtain Informed consent for elective surgery based on legal requirements in elective and repeated anaesthesia?</a:t>
+                <a:rPr lang="en-GB" dirty="0"/>
+                <a:t>When do you need to obtain Informed consent for elective surgery based on legal requirements for simple and complex procedures?</a:t>
               </a:r>
-              <a:endParaRPr lang="de-DE" dirty="0"/>
+              <a:br>
+                <a:rPr lang="en-GB" dirty="0"/>
+              </a:br>
+              <a:endParaRPr lang="de-DE" dirty="0">
+                <a:latin typeface="Arial" panose="020B0604020202020204" pitchFamily="34" charset="0"/>
+                <a:cs typeface="Arial" panose="020B0604020202020204" pitchFamily="34" charset="0"/>
+              </a:endParaRPr>
             </a:p>
           </p:txBody>
         </p:sp>
@@ -4986,10 +4995,10 @@
           </p:nvGrpSpPr>
           <p:grpSpPr>
             <a:xfrm>
-              <a:off x="2939181" y="5962040"/>
-              <a:ext cx="7196110" cy="461665"/>
-              <a:chOff x="2939181" y="6555807"/>
-              <a:chExt cx="7196110" cy="461665"/>
+              <a:off x="2939181" y="5920000"/>
+              <a:ext cx="7196110" cy="503705"/>
+              <a:chOff x="2939181" y="6513767"/>
+              <a:chExt cx="7196110" cy="503705"/>
             </a:xfrm>
           </p:grpSpPr>
           <p:sp>
@@ -5006,7 +5015,7 @@
             </p:nvSpPr>
             <p:spPr>
               <a:xfrm>
-                <a:off x="2939181" y="6555807"/>
+                <a:off x="2939181" y="6513767"/>
                 <a:ext cx="1665769" cy="461665"/>
               </a:xfrm>
               <a:prstGeom prst="rect">

</xml_diff>

<commit_message>
powerpoint file <24 >24 updated
</commit_message>
<xml_diff>
--- a/Plots.pptx
+++ b/Plots.pptx
@@ -5,12 +5,13 @@
     <p:sldMasterId id="2147483648" r:id="rId1"/>
   </p:sldMasterIdLst>
   <p:notesMasterIdLst>
-    <p:notesMasterId r:id="rId5"/>
+    <p:notesMasterId r:id="rId6"/>
   </p:notesMasterIdLst>
   <p:sldIdLst>
     <p:sldId id="256" r:id="rId2"/>
     <p:sldId id="258" r:id="rId3"/>
     <p:sldId id="257" r:id="rId4"/>
+    <p:sldId id="259" r:id="rId5"/>
   </p:sldIdLst>
   <p:sldSz cx="12192000" cy="6858000"/>
   <p:notesSz cx="6858000" cy="9144000"/>
@@ -5083,6 +5084,256 @@
     <p:extLst>
       <p:ext uri="{BB962C8B-B14F-4D97-AF65-F5344CB8AC3E}">
         <p14:creationId xmlns:p14="http://schemas.microsoft.com/office/powerpoint/2010/main" val="2516805712"/>
+      </p:ext>
+    </p:extLst>
+  </p:cSld>
+  <p:clrMapOvr>
+    <a:masterClrMapping/>
+  </p:clrMapOvr>
+</p:sld>
+</file>
+
+<file path=ppt/slides/slide4.xml><?xml version="1.0" encoding="utf-8"?>
+<p:sld xmlns:a="http://schemas.openxmlformats.org/drawingml/2006/main" xmlns:r="http://schemas.openxmlformats.org/officeDocument/2006/relationships" xmlns:p="http://schemas.openxmlformats.org/presentationml/2006/main">
+  <p:cSld>
+    <p:spTree>
+      <p:nvGrpSpPr>
+        <p:cNvPr id="1" name=""/>
+        <p:cNvGrpSpPr/>
+        <p:nvPr/>
+      </p:nvGrpSpPr>
+      <p:grpSpPr>
+        <a:xfrm>
+          <a:off x="0" y="0"/>
+          <a:ext cx="0" cy="0"/>
+          <a:chOff x="0" y="0"/>
+          <a:chExt cx="0" cy="0"/>
+        </a:xfrm>
+      </p:grpSpPr>
+      <p:grpSp>
+        <p:nvGrpSpPr>
+          <p:cNvPr id="4" name="Group 3">
+            <a:extLst>
+              <a:ext uri="{FF2B5EF4-FFF2-40B4-BE49-F238E27FC236}">
+                <a16:creationId xmlns:a16="http://schemas.microsoft.com/office/drawing/2014/main" id="{1F3117F5-9A49-014C-A7F0-B30AEF0204A2}"/>
+              </a:ext>
+            </a:extLst>
+          </p:cNvPr>
+          <p:cNvGrpSpPr/>
+          <p:nvPr/>
+        </p:nvGrpSpPr>
+        <p:grpSpPr>
+          <a:xfrm>
+            <a:off x="1502267" y="445380"/>
+            <a:ext cx="9057988" cy="6209552"/>
+            <a:chOff x="1371642" y="214153"/>
+            <a:chExt cx="9057988" cy="6209552"/>
+          </a:xfrm>
+        </p:grpSpPr>
+        <p:sp>
+          <p:nvSpPr>
+            <p:cNvPr id="7" name="Rectangle 6">
+              <a:extLst>
+                <a:ext uri="{FF2B5EF4-FFF2-40B4-BE49-F238E27FC236}">
+                  <a16:creationId xmlns:a16="http://schemas.microsoft.com/office/drawing/2014/main" id="{6EAB5708-B356-C741-B370-8F1E901CBBF7}"/>
+                </a:ext>
+              </a:extLst>
+            </p:cNvPr>
+            <p:cNvSpPr/>
+            <p:nvPr/>
+          </p:nvSpPr>
+          <p:spPr>
+            <a:xfrm>
+              <a:off x="1371642" y="214153"/>
+              <a:ext cx="9057988" cy="923330"/>
+            </a:xfrm>
+            <a:prstGeom prst="rect">
+              <a:avLst/>
+            </a:prstGeom>
+          </p:spPr>
+          <p:txBody>
+            <a:bodyPr wrap="square">
+              <a:spAutoFit/>
+            </a:bodyPr>
+            <a:lstStyle/>
+            <a:p>
+              <a:pPr algn="ctr"/>
+              <a:r>
+                <a:rPr lang="en-GB" dirty="0"/>
+                <a:t>When do you need to obtain Informed consent for elective surgery based on legal requirements for simple and complex procedures?</a:t>
+              </a:r>
+              <a:br>
+                <a:rPr lang="en-GB" dirty="0"/>
+              </a:br>
+              <a:endParaRPr lang="de-DE" dirty="0">
+                <a:latin typeface="Arial" panose="020B0604020202020204" pitchFamily="34" charset="0"/>
+                <a:cs typeface="Arial" panose="020B0604020202020204" pitchFamily="34" charset="0"/>
+              </a:endParaRPr>
+            </a:p>
+          </p:txBody>
+        </p:sp>
+        <p:grpSp>
+          <p:nvGrpSpPr>
+            <p:cNvPr id="8" name="Group 7">
+              <a:extLst>
+                <a:ext uri="{FF2B5EF4-FFF2-40B4-BE49-F238E27FC236}">
+                  <a16:creationId xmlns:a16="http://schemas.microsoft.com/office/drawing/2014/main" id="{52CCF8FF-628E-2A47-A212-365F99A01B6B}"/>
+                </a:ext>
+              </a:extLst>
+            </p:cNvPr>
+            <p:cNvGrpSpPr/>
+            <p:nvPr/>
+          </p:nvGrpSpPr>
+          <p:grpSpPr>
+            <a:xfrm>
+              <a:off x="3254489" y="5920000"/>
+              <a:ext cx="6901822" cy="503705"/>
+              <a:chOff x="3254489" y="6513767"/>
+              <a:chExt cx="6901822" cy="503705"/>
+            </a:xfrm>
+          </p:grpSpPr>
+          <p:sp>
+            <p:nvSpPr>
+              <p:cNvPr id="9" name="Rectangle 8">
+                <a:extLst>
+                  <a:ext uri="{FF2B5EF4-FFF2-40B4-BE49-F238E27FC236}">
+                    <a16:creationId xmlns:a16="http://schemas.microsoft.com/office/drawing/2014/main" id="{D0858A36-4CBD-194E-A6D3-D23A809D48E7}"/>
+                  </a:ext>
+                </a:extLst>
+              </p:cNvPr>
+              <p:cNvSpPr/>
+              <p:nvPr/>
+            </p:nvSpPr>
+            <p:spPr>
+              <a:xfrm>
+                <a:off x="3254489" y="6513767"/>
+                <a:ext cx="1665769" cy="461665"/>
+              </a:xfrm>
+              <a:prstGeom prst="rect">
+                <a:avLst/>
+              </a:prstGeom>
+            </p:spPr>
+            <p:txBody>
+              <a:bodyPr wrap="square">
+                <a:spAutoFit/>
+              </a:bodyPr>
+              <a:lstStyle/>
+              <a:p>
+                <a:r>
+                  <a:rPr lang="de-DE" sz="2400" b="1" dirty="0">
+                    <a:latin typeface="Avenir Book" panose="02000503020000020003" pitchFamily="2" charset="0"/>
+                    <a:cs typeface="AL BAYAN PLAIN" pitchFamily="2" charset="-78"/>
+                  </a:rPr>
+                  <a:t>Simple</a:t>
+                </a:r>
+              </a:p>
+            </p:txBody>
+          </p:sp>
+          <p:sp>
+            <p:nvSpPr>
+              <p:cNvPr id="10" name="TextBox 9">
+                <a:extLst>
+                  <a:ext uri="{FF2B5EF4-FFF2-40B4-BE49-F238E27FC236}">
+                    <a16:creationId xmlns:a16="http://schemas.microsoft.com/office/drawing/2014/main" id="{D676B28A-D58A-8B49-8E8E-546D432745D4}"/>
+                  </a:ext>
+                </a:extLst>
+              </p:cNvPr>
+              <p:cNvSpPr txBox="1"/>
+              <p:nvPr/>
+            </p:nvSpPr>
+            <p:spPr>
+              <a:xfrm>
+                <a:off x="8215899" y="6555807"/>
+                <a:ext cx="1940412" cy="461665"/>
+              </a:xfrm>
+              <a:prstGeom prst="rect">
+                <a:avLst/>
+              </a:prstGeom>
+              <a:noFill/>
+            </p:spPr>
+            <p:txBody>
+              <a:bodyPr wrap="square" rtlCol="0">
+                <a:spAutoFit/>
+              </a:bodyPr>
+              <a:lstStyle/>
+              <a:p>
+                <a:r>
+                  <a:rPr lang="de-DE" sz="2400" b="1" dirty="0">
+                    <a:latin typeface="Avenir Book" panose="02000503020000020003" pitchFamily="2" charset="0"/>
+                    <a:cs typeface="AL BAYAN PLAIN" pitchFamily="2" charset="-78"/>
+                  </a:rPr>
+                  <a:t>Complex</a:t>
+                </a:r>
+                <a:endParaRPr lang="de-DE" sz="2400" dirty="0"/>
+              </a:p>
+            </p:txBody>
+          </p:sp>
+        </p:grpSp>
+      </p:grpSp>
+      <p:pic>
+        <p:nvPicPr>
+          <p:cNvPr id="11" name="Picture 10">
+            <a:extLst>
+              <a:ext uri="{FF2B5EF4-FFF2-40B4-BE49-F238E27FC236}">
+                <a16:creationId xmlns:a16="http://schemas.microsoft.com/office/drawing/2014/main" id="{BE1B3535-8A07-C543-A3E4-9C9461286A71}"/>
+              </a:ext>
+            </a:extLst>
+          </p:cNvPr>
+          <p:cNvPicPr>
+            <a:picLocks noChangeAspect="1"/>
+          </p:cNvPicPr>
+          <p:nvPr/>
+        </p:nvPicPr>
+        <p:blipFill>
+          <a:blip r:embed="rId2"/>
+          <a:stretch>
+            <a:fillRect/>
+          </a:stretch>
+        </p:blipFill>
+        <p:spPr>
+          <a:xfrm>
+            <a:off x="1050506" y="1454150"/>
+            <a:ext cx="4038600" cy="3949700"/>
+          </a:xfrm>
+          <a:prstGeom prst="rect">
+            <a:avLst/>
+          </a:prstGeom>
+        </p:spPr>
+      </p:pic>
+      <p:pic>
+        <p:nvPicPr>
+          <p:cNvPr id="12" name="Picture 11">
+            <a:extLst>
+              <a:ext uri="{FF2B5EF4-FFF2-40B4-BE49-F238E27FC236}">
+                <a16:creationId xmlns:a16="http://schemas.microsoft.com/office/drawing/2014/main" id="{16A9307D-B56F-154B-9847-71818EBB8902}"/>
+              </a:ext>
+            </a:extLst>
+          </p:cNvPr>
+          <p:cNvPicPr>
+            <a:picLocks noChangeAspect="1"/>
+          </p:cNvPicPr>
+          <p:nvPr/>
+        </p:nvPicPr>
+        <p:blipFill>
+          <a:blip r:embed="rId3"/>
+          <a:stretch>
+            <a:fillRect/>
+          </a:stretch>
+        </p:blipFill>
+        <p:spPr>
+          <a:xfrm>
+            <a:off x="6096000" y="1466850"/>
+            <a:ext cx="3937000" cy="3937000"/>
+          </a:xfrm>
+          <a:prstGeom prst="rect">
+            <a:avLst/>
+          </a:prstGeom>
+        </p:spPr>
+      </p:pic>
+    </p:spTree>
+    <p:extLst>
+      <p:ext uri="{BB962C8B-B14F-4D97-AF65-F5344CB8AC3E}">
+        <p14:creationId xmlns:p14="http://schemas.microsoft.com/office/powerpoint/2010/main" val="296467537"/>
       </p:ext>
     </p:extLst>
   </p:cSld>

</xml_diff>

<commit_message>
Erste Edits nach CHEFS
</commit_message>
<xml_diff>
--- a/Plots.pptx
+++ b/Plots.pptx
@@ -200,7 +200,7 @@
           <a:p>
             <a:fld id="{15C2EBE1-C605-144D-906C-CCD574CF72BF}" type="datetimeFigureOut">
               <a:rPr lang="de-DE" smtClean="0"/>
-              <a:t>14.04.22</a:t>
+              <a:t>11.06.22</a:t>
             </a:fld>
             <a:endParaRPr lang="de-DE"/>
           </a:p>
@@ -745,7 +745,7 @@
           <a:p>
             <a:fld id="{200276FF-7F20-CD40-8287-D8545D8CF22C}" type="datetimeFigureOut">
               <a:rPr lang="de-DE" smtClean="0"/>
-              <a:t>14.04.22</a:t>
+              <a:t>11.06.22</a:t>
             </a:fld>
             <a:endParaRPr lang="de-DE"/>
           </a:p>
@@ -945,7 +945,7 @@
           <a:p>
             <a:fld id="{200276FF-7F20-CD40-8287-D8545D8CF22C}" type="datetimeFigureOut">
               <a:rPr lang="de-DE" smtClean="0"/>
-              <a:t>14.04.22</a:t>
+              <a:t>11.06.22</a:t>
             </a:fld>
             <a:endParaRPr lang="de-DE"/>
           </a:p>
@@ -1155,7 +1155,7 @@
           <a:p>
             <a:fld id="{200276FF-7F20-CD40-8287-D8545D8CF22C}" type="datetimeFigureOut">
               <a:rPr lang="de-DE" smtClean="0"/>
-              <a:t>14.04.22</a:t>
+              <a:t>11.06.22</a:t>
             </a:fld>
             <a:endParaRPr lang="de-DE"/>
           </a:p>
@@ -1355,7 +1355,7 @@
           <a:p>
             <a:fld id="{200276FF-7F20-CD40-8287-D8545D8CF22C}" type="datetimeFigureOut">
               <a:rPr lang="de-DE" smtClean="0"/>
-              <a:t>14.04.22</a:t>
+              <a:t>11.06.22</a:t>
             </a:fld>
             <a:endParaRPr lang="de-DE"/>
           </a:p>
@@ -1631,7 +1631,7 @@
           <a:p>
             <a:fld id="{200276FF-7F20-CD40-8287-D8545D8CF22C}" type="datetimeFigureOut">
               <a:rPr lang="de-DE" smtClean="0"/>
-              <a:t>14.04.22</a:t>
+              <a:t>11.06.22</a:t>
             </a:fld>
             <a:endParaRPr lang="de-DE"/>
           </a:p>
@@ -1899,7 +1899,7 @@
           <a:p>
             <a:fld id="{200276FF-7F20-CD40-8287-D8545D8CF22C}" type="datetimeFigureOut">
               <a:rPr lang="de-DE" smtClean="0"/>
-              <a:t>14.04.22</a:t>
+              <a:t>11.06.22</a:t>
             </a:fld>
             <a:endParaRPr lang="de-DE"/>
           </a:p>
@@ -2314,7 +2314,7 @@
           <a:p>
             <a:fld id="{200276FF-7F20-CD40-8287-D8545D8CF22C}" type="datetimeFigureOut">
               <a:rPr lang="de-DE" smtClean="0"/>
-              <a:t>14.04.22</a:t>
+              <a:t>11.06.22</a:t>
             </a:fld>
             <a:endParaRPr lang="de-DE"/>
           </a:p>
@@ -2456,7 +2456,7 @@
           <a:p>
             <a:fld id="{200276FF-7F20-CD40-8287-D8545D8CF22C}" type="datetimeFigureOut">
               <a:rPr lang="de-DE" smtClean="0"/>
-              <a:t>14.04.22</a:t>
+              <a:t>11.06.22</a:t>
             </a:fld>
             <a:endParaRPr lang="de-DE"/>
           </a:p>
@@ -2569,7 +2569,7 @@
           <a:p>
             <a:fld id="{200276FF-7F20-CD40-8287-D8545D8CF22C}" type="datetimeFigureOut">
               <a:rPr lang="de-DE" smtClean="0"/>
-              <a:t>14.04.22</a:t>
+              <a:t>11.06.22</a:t>
             </a:fld>
             <a:endParaRPr lang="de-DE"/>
           </a:p>
@@ -2882,7 +2882,7 @@
           <a:p>
             <a:fld id="{200276FF-7F20-CD40-8287-D8545D8CF22C}" type="datetimeFigureOut">
               <a:rPr lang="de-DE" smtClean="0"/>
-              <a:t>14.04.22</a:t>
+              <a:t>11.06.22</a:t>
             </a:fld>
             <a:endParaRPr lang="de-DE"/>
           </a:p>
@@ -3171,7 +3171,7 @@
           <a:p>
             <a:fld id="{200276FF-7F20-CD40-8287-D8545D8CF22C}" type="datetimeFigureOut">
               <a:rPr lang="de-DE" smtClean="0"/>
-              <a:t>14.04.22</a:t>
+              <a:t>11.06.22</a:t>
             </a:fld>
             <a:endParaRPr lang="de-DE"/>
           </a:p>
@@ -3414,7 +3414,7 @@
           <a:p>
             <a:fld id="{200276FF-7F20-CD40-8287-D8545D8CF22C}" type="datetimeFigureOut">
               <a:rPr lang="de-DE" smtClean="0"/>
-              <a:t>14.04.22</a:t>
+              <a:t>11.06.22</a:t>
             </a:fld>
             <a:endParaRPr lang="de-DE"/>
           </a:p>
@@ -3845,8 +3845,8 @@
         </p:nvSpPr>
         <p:spPr>
           <a:xfrm>
-            <a:off x="2903562" y="6070392"/>
-            <a:ext cx="1665769" cy="461665"/>
+            <a:off x="2603804" y="6070392"/>
+            <a:ext cx="2400492" cy="584775"/>
           </a:xfrm>
           <a:prstGeom prst="rect">
             <a:avLst/>
@@ -3859,7 +3859,7 @@
           <a:lstStyle/>
           <a:p>
             <a:r>
-              <a:rPr lang="de-DE" sz="2400" dirty="0">
+              <a:rPr lang="de-DE" sz="3200" b="1" dirty="0">
                 <a:latin typeface="Avenir Book" panose="02000503020000020003" pitchFamily="2" charset="0"/>
                 <a:cs typeface="Al Bayan Plain" pitchFamily="2" charset="-78"/>
               </a:rPr>
@@ -3882,8 +3882,8 @@
         </p:nvSpPr>
         <p:spPr>
           <a:xfrm>
-            <a:off x="7611348" y="6085782"/>
-            <a:ext cx="1940412" cy="461665"/>
+            <a:off x="7356380" y="6085782"/>
+            <a:ext cx="2633561" cy="584775"/>
           </a:xfrm>
           <a:prstGeom prst="rect">
             <a:avLst/>
@@ -3897,13 +3897,13 @@
           <a:lstStyle/>
           <a:p>
             <a:r>
-              <a:rPr lang="de-DE" sz="2400" dirty="0">
+              <a:rPr lang="de-DE" sz="3200" b="1" dirty="0">
                 <a:latin typeface="Avenir Book" panose="02000503020000020003" pitchFamily="2" charset="0"/>
                 <a:cs typeface="Al Bayan Plain" pitchFamily="2" charset="-78"/>
               </a:rPr>
-              <a:t>B: Telefone</a:t>
-            </a:r>
-            <a:endParaRPr lang="de-DE" sz="2400" dirty="0"/>
+              <a:t>B: Telephone</a:t>
+            </a:r>
+            <a:endParaRPr lang="de-DE" sz="3200" b="1" dirty="0"/>
           </a:p>
         </p:txBody>
       </p:sp>
@@ -3921,7 +3921,7 @@
         </p:nvGrpSpPr>
         <p:grpSpPr>
           <a:xfrm>
-            <a:off x="1111798" y="888736"/>
+            <a:off x="1111798" y="414416"/>
             <a:ext cx="4171017" cy="4954772"/>
             <a:chOff x="90523" y="1625005"/>
             <a:chExt cx="4171017" cy="4954772"/>
@@ -4218,7 +4218,7 @@
         </p:nvGrpSpPr>
         <p:grpSpPr>
           <a:xfrm>
-            <a:off x="5993227" y="925956"/>
+            <a:off x="5993227" y="451636"/>
             <a:ext cx="4112583" cy="4953177"/>
             <a:chOff x="4591938" y="783456"/>
             <a:chExt cx="4112583" cy="4953177"/>
@@ -4501,50 +4501,6 @@
           </p:txBody>
         </p:sp>
       </p:grpSp>
-      <p:sp>
-        <p:nvSpPr>
-          <p:cNvPr id="24" name="Rectangle 23">
-            <a:extLst>
-              <a:ext uri="{FF2B5EF4-FFF2-40B4-BE49-F238E27FC236}">
-                <a16:creationId xmlns:a16="http://schemas.microsoft.com/office/drawing/2014/main" id="{1F111F70-2217-604B-8AD5-7FA96C5F21E7}"/>
-              </a:ext>
-            </a:extLst>
-          </p:cNvPr>
-          <p:cNvSpPr/>
-          <p:nvPr/>
-        </p:nvSpPr>
-        <p:spPr>
-          <a:xfrm>
-            <a:off x="2130836" y="140787"/>
-            <a:ext cx="7930328" cy="646331"/>
-          </a:xfrm>
-          <a:prstGeom prst="rect">
-            <a:avLst/>
-          </a:prstGeom>
-        </p:spPr>
-        <p:txBody>
-          <a:bodyPr wrap="square">
-            <a:spAutoFit/>
-          </a:bodyPr>
-          <a:lstStyle/>
-          <a:p>
-            <a:pPr lvl="0" algn="ctr">
-              <a:defRPr/>
-            </a:pPr>
-            <a:r>
-              <a:rPr lang="en-GB" dirty="0">
-                <a:latin typeface="Arial" panose="020B0604020202020204" pitchFamily="34" charset="0"/>
-                <a:cs typeface="Arial" panose="020B0604020202020204" pitchFamily="34" charset="0"/>
-              </a:rPr>
-              <a:t>Is it possible to obtain informed consent online via internet/telefone in your routine setting? </a:t>
-            </a:r>
-            <a:endParaRPr lang="de-DE" dirty="0">
-              <a:latin typeface="Arial" panose="020B0604020202020204" pitchFamily="34" charset="0"/>
-              <a:cs typeface="Arial" panose="020B0604020202020204" pitchFamily="34" charset="0"/>
-            </a:endParaRPr>
-          </a:p>
-        </p:txBody>
-      </p:sp>
     </p:spTree>
     <p:extLst>
       <p:ext uri="{BB962C8B-B14F-4D97-AF65-F5344CB8AC3E}">

</xml_diff>